<commit_message>
+Types, Class Diagrams, import
</commit_message>
<xml_diff>
--- a/plugins/e4sm.de.metamodel.to.scpn.qvto/docs/Transformation Definition.pptx
+++ b/plugins/e4sm.de.metamodel.to.scpn.qvto/docs/Transformation Definition.pptx
@@ -5,7 +5,7 @@
     <p:sldMasterId id="2147483725" r:id="rId1"/>
   </p:sldMasterIdLst>
   <p:notesMasterIdLst>
-    <p:notesMasterId r:id="rId14"/>
+    <p:notesMasterId r:id="rId16"/>
   </p:notesMasterIdLst>
   <p:sldIdLst>
     <p:sldId id="256" r:id="rId2"/>
@@ -20,6 +20,8 @@
     <p:sldId id="261" r:id="rId11"/>
     <p:sldId id="257" r:id="rId12"/>
     <p:sldId id="259" r:id="rId13"/>
+    <p:sldId id="278" r:id="rId14"/>
+    <p:sldId id="279" r:id="rId15"/>
   </p:sldIdLst>
   <p:sldSz cx="12192000" cy="6858000"/>
   <p:notesSz cx="6858000" cy="9144000"/>
@@ -118,6 +120,11 @@
       </a:defRPr>
     </a:lvl9pPr>
   </p:defaultTextStyle>
+  <p:extLst>
+    <p:ext uri="{EFAFB233-063F-42B5-8137-9DF3F51BA10A}">
+      <p15:sldGuideLst xmlns:p15="http://schemas.microsoft.com/office/powerpoint/2012/main"/>
+    </p:ext>
+  </p:extLst>
 </p:presentation>
 </file>
 
@@ -203,7 +210,7 @@
           <a:p>
             <a:fld id="{6F74B443-8744-47F8-817D-247E18728C24}" type="datetimeFigureOut">
               <a:rPr lang="en-US" smtClean="0"/>
-              <a:t>3/9/2022</a:t>
+              <a:t>4/5/2022</a:t>
             </a:fld>
             <a:endParaRPr lang="en-US"/>
           </a:p>
@@ -2394,7 +2401,7 @@
           <a:p>
             <a:fld id="{79C5A860-F335-4252-AA00-24FB67ED2982}" type="datetime1">
               <a:rPr lang="en-US" smtClean="0"/>
-              <a:t>3/1/2022</a:t>
+              <a:t>4/5/2022</a:t>
             </a:fld>
             <a:endParaRPr lang="en-US"/>
           </a:p>
@@ -2593,7 +2600,7 @@
           <a:p>
             <a:fld id="{46AB1048-0047-48CA-88BA-D69B470942CF}" type="datetime1">
               <a:rPr lang="en-US" smtClean="0"/>
-              <a:t>3/1/2022</a:t>
+              <a:t>4/5/2022</a:t>
             </a:fld>
             <a:endParaRPr lang="en-US"/>
           </a:p>
@@ -2803,7 +2810,7 @@
           <a:p>
             <a:fld id="{5BD83879-648C-49A9-81A2-0EF5946532D0}" type="datetime1">
               <a:rPr lang="en-US" smtClean="0"/>
-              <a:t>3/1/2022</a:t>
+              <a:t>4/5/2022</a:t>
             </a:fld>
             <a:endParaRPr lang="en-US"/>
           </a:p>
@@ -3001,7 +3008,7 @@
           <a:p>
             <a:fld id="{D04BC802-30E3-4658-9CCA-F873646FEC67}" type="datetime1">
               <a:rPr lang="en-US" smtClean="0"/>
-              <a:t>3/1/2022</a:t>
+              <a:t>4/5/2022</a:t>
             </a:fld>
             <a:endParaRPr lang="en-US"/>
           </a:p>
@@ -3279,7 +3286,7 @@
           <a:p>
             <a:fld id="{0AB227A3-19CE-4153-81CE-64EB7AB094B3}" type="datetime1">
               <a:rPr lang="en-US" smtClean="0"/>
-              <a:t>3/1/2022</a:t>
+              <a:t>4/5/2022</a:t>
             </a:fld>
             <a:endParaRPr lang="en-US"/>
           </a:p>
@@ -3546,7 +3553,7 @@
           <a:p>
             <a:fld id="{B819A100-10F6-477E-8847-29D479EF1C92}" type="datetime1">
               <a:rPr lang="en-US" smtClean="0"/>
-              <a:t>3/1/2022</a:t>
+              <a:t>4/5/2022</a:t>
             </a:fld>
             <a:endParaRPr lang="en-US"/>
           </a:p>
@@ -3960,7 +3967,7 @@
           <a:p>
             <a:fld id="{5DF128AB-198A-495F-8475-FDB360C9873F}" type="datetime1">
               <a:rPr lang="en-US" smtClean="0"/>
-              <a:t>3/1/2022</a:t>
+              <a:t>4/5/2022</a:t>
             </a:fld>
             <a:endParaRPr lang="en-US"/>
           </a:p>
@@ -4101,7 +4108,7 @@
           <a:p>
             <a:fld id="{021A235E-F8FD-479F-9FC7-18BE84110877}" type="datetime1">
               <a:rPr lang="en-US" smtClean="0"/>
-              <a:t>3/1/2022</a:t>
+              <a:t>4/5/2022</a:t>
             </a:fld>
             <a:endParaRPr lang="en-US"/>
           </a:p>
@@ -4214,7 +4221,7 @@
           <a:p>
             <a:fld id="{E890F09B-68DA-462E-9DB4-4C9ADAB8CBCC}" type="datetime1">
               <a:rPr lang="en-US" smtClean="0"/>
-              <a:t>3/1/2022</a:t>
+              <a:t>4/5/2022</a:t>
             </a:fld>
             <a:endParaRPr lang="en-US"/>
           </a:p>
@@ -4533,7 +4540,7 @@
           <a:p>
             <a:fld id="{17AC4E36-FABE-47EB-AA7F-C19A93824617}" type="datetime1">
               <a:rPr lang="en-US" smtClean="0"/>
-              <a:t>3/1/2022</a:t>
+              <a:t>4/5/2022</a:t>
             </a:fld>
             <a:endParaRPr lang="en-US"/>
           </a:p>
@@ -4830,7 +4837,7 @@
           <a:p>
             <a:fld id="{F199CE6B-5DE6-4A2D-B72E-5E8969F9F56F}" type="datetime1">
               <a:rPr lang="en-US" smtClean="0"/>
-              <a:t>3/1/2022</a:t>
+              <a:t>4/5/2022</a:t>
             </a:fld>
             <a:endParaRPr lang="en-US"/>
           </a:p>
@@ -5688,7 +5695,7 @@
           <a:p>
             <a:fld id="{F481A142-DA77-4A5F-AD1F-14E6C18F0F5F}" type="datetime1">
               <a:rPr lang="en-US" smtClean="0"/>
-              <a:t>3/1/2022</a:t>
+              <a:t>4/5/2022</a:t>
             </a:fld>
             <a:endParaRPr lang="en-US" dirty="0"/>
           </a:p>
@@ -8107,13 +8114,13 @@
   <p:clrMapOvr>
     <a:masterClrMapping/>
   </p:clrMapOvr>
-  <mc:AlternateContent xmlns:mc="http://schemas.openxmlformats.org/markup-compatibility/2006">
-    <mc:Choice xmlns:p159="http://schemas.microsoft.com/office/powerpoint/2015/09/main" Requires="p159">
+  <mc:AlternateContent xmlns:mc="http://schemas.openxmlformats.org/markup-compatibility/2006" xmlns:p159="http://schemas.microsoft.com/office/powerpoint/2015/09/main">
+    <mc:Choice Requires="p159">
       <p:transition xmlns:p14="http://schemas.microsoft.com/office/powerpoint/2010/main" spd="slow" p14:dur="3000">
         <p159:morph option="byObject"/>
       </p:transition>
     </mc:Choice>
-    <mc:Fallback>
+    <mc:Fallback xmlns="">
       <p:transition spd="slow">
         <p:fade/>
       </p:transition>
@@ -8353,6 +8360,804 @@
   <p:clrMapOvr>
     <a:masterClrMapping/>
   </p:clrMapOvr>
+</p:sld>
+</file>
+
+<file path=ppt/slides/slide13.xml><?xml version="1.0" encoding="utf-8"?>
+<p:sld xmlns:a="http://schemas.openxmlformats.org/drawingml/2006/main" xmlns:r="http://schemas.openxmlformats.org/officeDocument/2006/relationships" xmlns:p="http://schemas.openxmlformats.org/presentationml/2006/main">
+  <p:cSld>
+    <p:spTree>
+      <p:nvGrpSpPr>
+        <p:cNvPr id="1" name=""/>
+        <p:cNvGrpSpPr/>
+        <p:nvPr/>
+      </p:nvGrpSpPr>
+      <p:grpSpPr>
+        <a:xfrm>
+          <a:off x="0" y="0"/>
+          <a:ext cx="0" cy="0"/>
+          <a:chOff x="0" y="0"/>
+          <a:chExt cx="0" cy="0"/>
+        </a:xfrm>
+      </p:grpSpPr>
+      <p:sp>
+        <p:nvSpPr>
+          <p:cNvPr id="2" name="Title 1">
+            <a:extLst>
+              <a:ext uri="{FF2B5EF4-FFF2-40B4-BE49-F238E27FC236}">
+                <a16:creationId xmlns:a16="http://schemas.microsoft.com/office/drawing/2014/main" id="{531F8B0F-255E-495C-872C-6408AA751A0F}"/>
+              </a:ext>
+            </a:extLst>
+          </p:cNvPr>
+          <p:cNvSpPr>
+            <a:spLocks noGrp="1"/>
+          </p:cNvSpPr>
+          <p:nvPr>
+            <p:ph type="title"/>
+          </p:nvPr>
+        </p:nvSpPr>
+        <p:spPr/>
+        <p:txBody>
+          <a:bodyPr/>
+          <a:lstStyle/>
+          <a:p>
+            <a:r>
+              <a:rPr lang="en-US" dirty="0"/>
+              <a:t>Components, before</a:t>
+            </a:r>
+          </a:p>
+        </p:txBody>
+      </p:sp>
+      <p:pic>
+        <p:nvPicPr>
+          <p:cNvPr id="11" name="Picture 10">
+            <a:extLst>
+              <a:ext uri="{FF2B5EF4-FFF2-40B4-BE49-F238E27FC236}">
+                <a16:creationId xmlns:a16="http://schemas.microsoft.com/office/drawing/2014/main" id="{C8B2582B-6F5F-41E1-82AB-6AE0A0E8EED8}"/>
+              </a:ext>
+            </a:extLst>
+          </p:cNvPr>
+          <p:cNvPicPr>
+            <a:picLocks noChangeAspect="1"/>
+          </p:cNvPicPr>
+          <p:nvPr/>
+        </p:nvPicPr>
+        <p:blipFill>
+          <a:blip r:embed="rId2"/>
+          <a:stretch>
+            <a:fillRect/>
+          </a:stretch>
+        </p:blipFill>
+        <p:spPr>
+          <a:xfrm>
+            <a:off x="6876157" y="323850"/>
+            <a:ext cx="5315843" cy="6210300"/>
+          </a:xfrm>
+          <a:prstGeom prst="rect">
+            <a:avLst/>
+          </a:prstGeom>
+        </p:spPr>
+      </p:pic>
+      <p:pic>
+        <p:nvPicPr>
+          <p:cNvPr id="12" name="Picture 11">
+            <a:extLst>
+              <a:ext uri="{FF2B5EF4-FFF2-40B4-BE49-F238E27FC236}">
+                <a16:creationId xmlns:a16="http://schemas.microsoft.com/office/drawing/2014/main" id="{12F7F6FD-4112-4913-B92D-0EA30BB05295}"/>
+              </a:ext>
+            </a:extLst>
+          </p:cNvPr>
+          <p:cNvPicPr>
+            <a:picLocks noChangeAspect="1"/>
+          </p:cNvPicPr>
+          <p:nvPr/>
+        </p:nvPicPr>
+        <p:blipFill>
+          <a:blip r:embed="rId3"/>
+          <a:stretch>
+            <a:fillRect/>
+          </a:stretch>
+        </p:blipFill>
+        <p:spPr>
+          <a:xfrm>
+            <a:off x="457200" y="2023886"/>
+            <a:ext cx="3781953" cy="2524477"/>
+          </a:xfrm>
+          <a:prstGeom prst="rect">
+            <a:avLst/>
+          </a:prstGeom>
+        </p:spPr>
+      </p:pic>
+    </p:spTree>
+    <p:extLst>
+      <p:ext uri="{BB962C8B-B14F-4D97-AF65-F5344CB8AC3E}">
+        <p14:creationId xmlns:p14="http://schemas.microsoft.com/office/powerpoint/2010/main" val="3052128904"/>
+      </p:ext>
+    </p:extLst>
+  </p:cSld>
+  <p:clrMapOvr>
+    <a:masterClrMapping/>
+  </p:clrMapOvr>
+</p:sld>
+</file>
+
+<file path=ppt/slides/slide14.xml><?xml version="1.0" encoding="utf-8"?>
+<p:sld xmlns:a="http://schemas.openxmlformats.org/drawingml/2006/main" xmlns:r="http://schemas.openxmlformats.org/officeDocument/2006/relationships" xmlns:p="http://schemas.openxmlformats.org/presentationml/2006/main">
+  <p:cSld>
+    <p:spTree>
+      <p:nvGrpSpPr>
+        <p:cNvPr id="1" name=""/>
+        <p:cNvGrpSpPr/>
+        <p:nvPr/>
+      </p:nvGrpSpPr>
+      <p:grpSpPr>
+        <a:xfrm>
+          <a:off x="0" y="0"/>
+          <a:ext cx="0" cy="0"/>
+          <a:chOff x="0" y="0"/>
+          <a:chExt cx="0" cy="0"/>
+        </a:xfrm>
+      </p:grpSpPr>
+      <p:pic>
+        <p:nvPicPr>
+          <p:cNvPr id="18" name="Picture 17">
+            <a:extLst>
+              <a:ext uri="{FF2B5EF4-FFF2-40B4-BE49-F238E27FC236}">
+                <a16:creationId xmlns:a16="http://schemas.microsoft.com/office/drawing/2014/main" id="{A042E77A-C236-4288-A07E-8556420FA4D0}"/>
+              </a:ext>
+            </a:extLst>
+          </p:cNvPr>
+          <p:cNvPicPr>
+            <a:picLocks noChangeAspect="1"/>
+          </p:cNvPicPr>
+          <p:nvPr/>
+        </p:nvPicPr>
+        <p:blipFill>
+          <a:blip r:embed="rId2"/>
+          <a:stretch>
+            <a:fillRect/>
+          </a:stretch>
+        </p:blipFill>
+        <p:spPr>
+          <a:xfrm>
+            <a:off x="454961" y="2023886"/>
+            <a:ext cx="3781953" cy="2524477"/>
+          </a:xfrm>
+          <a:prstGeom prst="rect">
+            <a:avLst/>
+          </a:prstGeom>
+        </p:spPr>
+      </p:pic>
+      <p:sp>
+        <p:nvSpPr>
+          <p:cNvPr id="2" name="Title 1">
+            <a:extLst>
+              <a:ext uri="{FF2B5EF4-FFF2-40B4-BE49-F238E27FC236}">
+                <a16:creationId xmlns:a16="http://schemas.microsoft.com/office/drawing/2014/main" id="{531F8B0F-255E-495C-872C-6408AA751A0F}"/>
+              </a:ext>
+            </a:extLst>
+          </p:cNvPr>
+          <p:cNvSpPr>
+            <a:spLocks noGrp="1"/>
+          </p:cNvSpPr>
+          <p:nvPr>
+            <p:ph type="title"/>
+          </p:nvPr>
+        </p:nvSpPr>
+        <p:spPr/>
+        <p:txBody>
+          <a:bodyPr>
+            <a:normAutofit/>
+          </a:bodyPr>
+          <a:lstStyle/>
+          <a:p>
+            <a:r>
+              <a:rPr lang="en-US" dirty="0"/>
+              <a:t>Components, after</a:t>
+            </a:r>
+          </a:p>
+        </p:txBody>
+      </p:sp>
+      <p:pic>
+        <p:nvPicPr>
+          <p:cNvPr id="14" name="Content Placeholder 13">
+            <a:extLst>
+              <a:ext uri="{FF2B5EF4-FFF2-40B4-BE49-F238E27FC236}">
+                <a16:creationId xmlns:a16="http://schemas.microsoft.com/office/drawing/2014/main" id="{427603C7-2603-4F90-A6D8-69D3B4DAA898}"/>
+              </a:ext>
+            </a:extLst>
+          </p:cNvPr>
+          <p:cNvPicPr>
+            <a:picLocks noGrp="1" noChangeAspect="1"/>
+          </p:cNvPicPr>
+          <p:nvPr>
+            <p:ph idx="1"/>
+          </p:nvPr>
+        </p:nvPicPr>
+        <p:blipFill>
+          <a:blip r:embed="rId3"/>
+          <a:stretch>
+            <a:fillRect/>
+          </a:stretch>
+        </p:blipFill>
+        <p:spPr>
+          <a:xfrm>
+            <a:off x="4729029" y="1981113"/>
+            <a:ext cx="1914792" cy="3658111"/>
+          </a:xfrm>
+        </p:spPr>
+      </p:pic>
+      <p:pic>
+        <p:nvPicPr>
+          <p:cNvPr id="16" name="Picture 15">
+            <a:extLst>
+              <a:ext uri="{FF2B5EF4-FFF2-40B4-BE49-F238E27FC236}">
+                <a16:creationId xmlns:a16="http://schemas.microsoft.com/office/drawing/2014/main" id="{7575259D-CF2B-4207-939D-69D2C5272CE8}"/>
+              </a:ext>
+            </a:extLst>
+          </p:cNvPr>
+          <p:cNvPicPr>
+            <a:picLocks noChangeAspect="1"/>
+          </p:cNvPicPr>
+          <p:nvPr/>
+        </p:nvPicPr>
+        <p:blipFill>
+          <a:blip r:embed="rId4"/>
+          <a:stretch>
+            <a:fillRect/>
+          </a:stretch>
+        </p:blipFill>
+        <p:spPr>
+          <a:xfrm>
+            <a:off x="1769594" y="2785973"/>
+            <a:ext cx="1152686" cy="1286054"/>
+          </a:xfrm>
+          <a:prstGeom prst="rect">
+            <a:avLst/>
+          </a:prstGeom>
+        </p:spPr>
+      </p:pic>
+      <p:pic>
+        <p:nvPicPr>
+          <p:cNvPr id="20" name="Picture 19">
+            <a:extLst>
+              <a:ext uri="{FF2B5EF4-FFF2-40B4-BE49-F238E27FC236}">
+                <a16:creationId xmlns:a16="http://schemas.microsoft.com/office/drawing/2014/main" id="{058152B4-81D0-4554-8F86-20CE7A5B2441}"/>
+              </a:ext>
+            </a:extLst>
+          </p:cNvPr>
+          <p:cNvPicPr>
+            <a:picLocks noChangeAspect="1"/>
+          </p:cNvPicPr>
+          <p:nvPr/>
+        </p:nvPicPr>
+        <p:blipFill>
+          <a:blip r:embed="rId5"/>
+          <a:stretch>
+            <a:fillRect/>
+          </a:stretch>
+        </p:blipFill>
+        <p:spPr>
+          <a:xfrm>
+            <a:off x="6780552" y="278892"/>
+            <a:ext cx="5411448" cy="6300216"/>
+          </a:xfrm>
+          <a:prstGeom prst="rect">
+            <a:avLst/>
+          </a:prstGeom>
+        </p:spPr>
+      </p:pic>
+      <p:pic>
+        <p:nvPicPr>
+          <p:cNvPr id="22" name="Picture 21">
+            <a:extLst>
+              <a:ext uri="{FF2B5EF4-FFF2-40B4-BE49-F238E27FC236}">
+                <a16:creationId xmlns:a16="http://schemas.microsoft.com/office/drawing/2014/main" id="{5CBF3533-925F-4856-8B83-D739914B4633}"/>
+              </a:ext>
+            </a:extLst>
+          </p:cNvPr>
+          <p:cNvPicPr>
+            <a:picLocks noChangeAspect="1"/>
+          </p:cNvPicPr>
+          <p:nvPr/>
+        </p:nvPicPr>
+        <p:blipFill>
+          <a:blip r:embed="rId6"/>
+          <a:stretch>
+            <a:fillRect/>
+          </a:stretch>
+        </p:blipFill>
+        <p:spPr>
+          <a:xfrm>
+            <a:off x="1528630" y="4688902"/>
+            <a:ext cx="1895740" cy="1495634"/>
+          </a:xfrm>
+          <a:prstGeom prst="rect">
+            <a:avLst/>
+          </a:prstGeom>
+        </p:spPr>
+      </p:pic>
+      <p:sp>
+        <p:nvSpPr>
+          <p:cNvPr id="23" name="TextBox 22">
+            <a:extLst>
+              <a:ext uri="{FF2B5EF4-FFF2-40B4-BE49-F238E27FC236}">
+                <a16:creationId xmlns:a16="http://schemas.microsoft.com/office/drawing/2014/main" id="{6A82496F-EECC-417A-9A97-C313FFC00463}"/>
+              </a:ext>
+            </a:extLst>
+          </p:cNvPr>
+          <p:cNvSpPr txBox="1"/>
+          <p:nvPr/>
+        </p:nvSpPr>
+        <p:spPr>
+          <a:xfrm>
+            <a:off x="985837" y="6300216"/>
+            <a:ext cx="2981326" cy="369332"/>
+          </a:xfrm>
+          <a:prstGeom prst="rect">
+            <a:avLst/>
+          </a:prstGeom>
+          <a:noFill/>
+        </p:spPr>
+        <p:txBody>
+          <a:bodyPr wrap="square" rtlCol="0">
+            <a:spAutoFit/>
+          </a:bodyPr>
+          <a:lstStyle/>
+          <a:p>
+            <a:r>
+              <a:rPr lang="en-US" dirty="0"/>
+              <a:t>Support for time functions</a:t>
+            </a:r>
+          </a:p>
+        </p:txBody>
+      </p:sp>
+      <p:sp>
+        <p:nvSpPr>
+          <p:cNvPr id="24" name="TextBox 23">
+            <a:extLst>
+              <a:ext uri="{FF2B5EF4-FFF2-40B4-BE49-F238E27FC236}">
+                <a16:creationId xmlns:a16="http://schemas.microsoft.com/office/drawing/2014/main" id="{68F019A7-AF87-42AB-B4FB-1A7BD638FBB0}"/>
+              </a:ext>
+            </a:extLst>
+          </p:cNvPr>
+          <p:cNvSpPr txBox="1"/>
+          <p:nvPr/>
+        </p:nvSpPr>
+        <p:spPr>
+          <a:xfrm>
+            <a:off x="7753350" y="373118"/>
+            <a:ext cx="2543175" cy="369332"/>
+          </a:xfrm>
+          <a:prstGeom prst="rect">
+            <a:avLst/>
+          </a:prstGeom>
+          <a:noFill/>
+        </p:spPr>
+        <p:txBody>
+          <a:bodyPr wrap="square" rtlCol="0">
+            <a:spAutoFit/>
+          </a:bodyPr>
+          <a:lstStyle/>
+          <a:p>
+            <a:r>
+              <a:rPr lang="en-US" dirty="0"/>
+              <a:t>Not yet implemented!</a:t>
+            </a:r>
+          </a:p>
+        </p:txBody>
+      </p:sp>
+    </p:spTree>
+    <p:extLst>
+      <p:ext uri="{BB962C8B-B14F-4D97-AF65-F5344CB8AC3E}">
+        <p14:creationId xmlns:p14="http://schemas.microsoft.com/office/powerpoint/2010/main" val="4264197598"/>
+      </p:ext>
+    </p:extLst>
+  </p:cSld>
+  <p:clrMapOvr>
+    <a:masterClrMapping/>
+  </p:clrMapOvr>
+  <p:timing>
+    <p:tnLst>
+      <p:par>
+        <p:cTn id="1" dur="indefinite" restart="never" nodeType="tmRoot">
+          <p:childTnLst>
+            <p:seq concurrent="1" nextAc="seek">
+              <p:cTn id="2" dur="indefinite" nodeType="mainSeq">
+                <p:childTnLst>
+                  <p:par>
+                    <p:cTn id="3" fill="hold">
+                      <p:stCondLst>
+                        <p:cond delay="indefinite"/>
+                      </p:stCondLst>
+                      <p:childTnLst>
+                        <p:par>
+                          <p:cTn id="4" fill="hold">
+                            <p:stCondLst>
+                              <p:cond delay="0"/>
+                            </p:stCondLst>
+                            <p:childTnLst>
+                              <p:par>
+                                <p:cTn id="5" presetID="10" presetClass="entr" presetSubtype="0" fill="hold" nodeType="clickEffect">
+                                  <p:stCondLst>
+                                    <p:cond delay="0"/>
+                                  </p:stCondLst>
+                                  <p:childTnLst>
+                                    <p:set>
+                                      <p:cBhvr>
+                                        <p:cTn id="6" dur="1" fill="hold">
+                                          <p:stCondLst>
+                                            <p:cond delay="0"/>
+                                          </p:stCondLst>
+                                        </p:cTn>
+                                        <p:tgtEl>
+                                          <p:spTgt spid="16"/>
+                                        </p:tgtEl>
+                                        <p:attrNameLst>
+                                          <p:attrName>style.visibility</p:attrName>
+                                        </p:attrNameLst>
+                                      </p:cBhvr>
+                                      <p:to>
+                                        <p:strVal val="visible"/>
+                                      </p:to>
+                                    </p:set>
+                                    <p:animEffect transition="in" filter="fade">
+                                      <p:cBhvr>
+                                        <p:cTn id="7" dur="500"/>
+                                        <p:tgtEl>
+                                          <p:spTgt spid="16"/>
+                                        </p:tgtEl>
+                                      </p:cBhvr>
+                                    </p:animEffect>
+                                  </p:childTnLst>
+                                </p:cTn>
+                              </p:par>
+                            </p:childTnLst>
+                          </p:cTn>
+                        </p:par>
+                      </p:childTnLst>
+                    </p:cTn>
+                  </p:par>
+                  <p:par>
+                    <p:cTn id="8" fill="hold">
+                      <p:stCondLst>
+                        <p:cond delay="indefinite"/>
+                      </p:stCondLst>
+                      <p:childTnLst>
+                        <p:par>
+                          <p:cTn id="9" fill="hold">
+                            <p:stCondLst>
+                              <p:cond delay="0"/>
+                            </p:stCondLst>
+                            <p:childTnLst>
+                              <p:par>
+                                <p:cTn id="10" presetID="10" presetClass="entr" presetSubtype="0" fill="hold" nodeType="clickEffect">
+                                  <p:stCondLst>
+                                    <p:cond delay="0"/>
+                                  </p:stCondLst>
+                                  <p:childTnLst>
+                                    <p:set>
+                                      <p:cBhvr>
+                                        <p:cTn id="11" dur="1" fill="hold">
+                                          <p:stCondLst>
+                                            <p:cond delay="0"/>
+                                          </p:stCondLst>
+                                        </p:cTn>
+                                        <p:tgtEl>
+                                          <p:spTgt spid="14"/>
+                                        </p:tgtEl>
+                                        <p:attrNameLst>
+                                          <p:attrName>style.visibility</p:attrName>
+                                        </p:attrNameLst>
+                                      </p:cBhvr>
+                                      <p:to>
+                                        <p:strVal val="visible"/>
+                                      </p:to>
+                                    </p:set>
+                                    <p:animEffect transition="in" filter="fade">
+                                      <p:cBhvr>
+                                        <p:cTn id="12" dur="500"/>
+                                        <p:tgtEl>
+                                          <p:spTgt spid="14"/>
+                                        </p:tgtEl>
+                                      </p:cBhvr>
+                                    </p:animEffect>
+                                  </p:childTnLst>
+                                </p:cTn>
+                              </p:par>
+                            </p:childTnLst>
+                          </p:cTn>
+                        </p:par>
+                      </p:childTnLst>
+                    </p:cTn>
+                  </p:par>
+                  <p:par>
+                    <p:cTn id="13" fill="hold">
+                      <p:stCondLst>
+                        <p:cond delay="indefinite"/>
+                      </p:stCondLst>
+                      <p:childTnLst>
+                        <p:par>
+                          <p:cTn id="14" fill="hold">
+                            <p:stCondLst>
+                              <p:cond delay="0"/>
+                            </p:stCondLst>
+                            <p:childTnLst>
+                              <p:par>
+                                <p:cTn id="15" presetID="10" presetClass="entr" presetSubtype="0" fill="hold" nodeType="clickEffect">
+                                  <p:stCondLst>
+                                    <p:cond delay="0"/>
+                                  </p:stCondLst>
+                                  <p:childTnLst>
+                                    <p:set>
+                                      <p:cBhvr>
+                                        <p:cTn id="16" dur="1" fill="hold">
+                                          <p:stCondLst>
+                                            <p:cond delay="0"/>
+                                          </p:stCondLst>
+                                        </p:cTn>
+                                        <p:tgtEl>
+                                          <p:spTgt spid="20"/>
+                                        </p:tgtEl>
+                                        <p:attrNameLst>
+                                          <p:attrName>style.visibility</p:attrName>
+                                        </p:attrNameLst>
+                                      </p:cBhvr>
+                                      <p:to>
+                                        <p:strVal val="visible"/>
+                                      </p:to>
+                                    </p:set>
+                                    <p:animEffect transition="in" filter="fade">
+                                      <p:cBhvr>
+                                        <p:cTn id="17" dur="500"/>
+                                        <p:tgtEl>
+                                          <p:spTgt spid="20"/>
+                                        </p:tgtEl>
+                                      </p:cBhvr>
+                                    </p:animEffect>
+                                  </p:childTnLst>
+                                </p:cTn>
+                              </p:par>
+                            </p:childTnLst>
+                          </p:cTn>
+                        </p:par>
+                        <p:par>
+                          <p:cTn id="18" fill="hold">
+                            <p:stCondLst>
+                              <p:cond delay="500"/>
+                            </p:stCondLst>
+                            <p:childTnLst>
+                              <p:par>
+                                <p:cTn id="19" presetID="10" presetClass="entr" presetSubtype="0" fill="hold" grpId="0" nodeType="afterEffect">
+                                  <p:stCondLst>
+                                    <p:cond delay="0"/>
+                                  </p:stCondLst>
+                                  <p:childTnLst>
+                                    <p:set>
+                                      <p:cBhvr>
+                                        <p:cTn id="20" dur="1" fill="hold">
+                                          <p:stCondLst>
+                                            <p:cond delay="0"/>
+                                          </p:stCondLst>
+                                        </p:cTn>
+                                        <p:tgtEl>
+                                          <p:spTgt spid="24"/>
+                                        </p:tgtEl>
+                                        <p:attrNameLst>
+                                          <p:attrName>style.visibility</p:attrName>
+                                        </p:attrNameLst>
+                                      </p:cBhvr>
+                                      <p:to>
+                                        <p:strVal val="visible"/>
+                                      </p:to>
+                                    </p:set>
+                                    <p:animEffect transition="in" filter="fade">
+                                      <p:cBhvr>
+                                        <p:cTn id="21" dur="500"/>
+                                        <p:tgtEl>
+                                          <p:spTgt spid="24"/>
+                                        </p:tgtEl>
+                                      </p:cBhvr>
+                                    </p:animEffect>
+                                  </p:childTnLst>
+                                </p:cTn>
+                              </p:par>
+                            </p:childTnLst>
+                          </p:cTn>
+                        </p:par>
+                      </p:childTnLst>
+                    </p:cTn>
+                  </p:par>
+                  <p:par>
+                    <p:cTn id="22" fill="hold">
+                      <p:stCondLst>
+                        <p:cond delay="indefinite"/>
+                      </p:stCondLst>
+                      <p:childTnLst>
+                        <p:par>
+                          <p:cTn id="23" fill="hold">
+                            <p:stCondLst>
+                              <p:cond delay="0"/>
+                            </p:stCondLst>
+                            <p:childTnLst>
+                              <p:par>
+                                <p:cTn id="24" presetID="2" presetClass="entr" presetSubtype="4" fill="hold" grpId="0" nodeType="clickEffect">
+                                  <p:stCondLst>
+                                    <p:cond delay="0"/>
+                                  </p:stCondLst>
+                                  <p:childTnLst>
+                                    <p:set>
+                                      <p:cBhvr>
+                                        <p:cTn id="25" dur="1" fill="hold">
+                                          <p:stCondLst>
+                                            <p:cond delay="0"/>
+                                          </p:stCondLst>
+                                        </p:cTn>
+                                        <p:tgtEl>
+                                          <p:spTgt spid="23"/>
+                                        </p:tgtEl>
+                                        <p:attrNameLst>
+                                          <p:attrName>style.visibility</p:attrName>
+                                        </p:attrNameLst>
+                                      </p:cBhvr>
+                                      <p:to>
+                                        <p:strVal val="visible"/>
+                                      </p:to>
+                                    </p:set>
+                                    <p:anim calcmode="lin" valueType="num">
+                                      <p:cBhvr additive="base">
+                                        <p:cTn id="26" dur="500" fill="hold"/>
+                                        <p:tgtEl>
+                                          <p:spTgt spid="23"/>
+                                        </p:tgtEl>
+                                        <p:attrNameLst>
+                                          <p:attrName>ppt_x</p:attrName>
+                                        </p:attrNameLst>
+                                      </p:cBhvr>
+                                      <p:tavLst>
+                                        <p:tav tm="0">
+                                          <p:val>
+                                            <p:strVal val="#ppt_x"/>
+                                          </p:val>
+                                        </p:tav>
+                                        <p:tav tm="100000">
+                                          <p:val>
+                                            <p:strVal val="#ppt_x"/>
+                                          </p:val>
+                                        </p:tav>
+                                      </p:tavLst>
+                                    </p:anim>
+                                    <p:anim calcmode="lin" valueType="num">
+                                      <p:cBhvr additive="base">
+                                        <p:cTn id="27" dur="500" fill="hold"/>
+                                        <p:tgtEl>
+                                          <p:spTgt spid="23"/>
+                                        </p:tgtEl>
+                                        <p:attrNameLst>
+                                          <p:attrName>ppt_y</p:attrName>
+                                        </p:attrNameLst>
+                                      </p:cBhvr>
+                                      <p:tavLst>
+                                        <p:tav tm="0">
+                                          <p:val>
+                                            <p:strVal val="1+#ppt_h/2"/>
+                                          </p:val>
+                                        </p:tav>
+                                        <p:tav tm="100000">
+                                          <p:val>
+                                            <p:strVal val="#ppt_y"/>
+                                          </p:val>
+                                        </p:tav>
+                                      </p:tavLst>
+                                    </p:anim>
+                                  </p:childTnLst>
+                                </p:cTn>
+                              </p:par>
+                              <p:par>
+                                <p:cTn id="28" presetID="2" presetClass="entr" presetSubtype="4" fill="hold" nodeType="withEffect">
+                                  <p:stCondLst>
+                                    <p:cond delay="0"/>
+                                  </p:stCondLst>
+                                  <p:childTnLst>
+                                    <p:set>
+                                      <p:cBhvr>
+                                        <p:cTn id="29" dur="1" fill="hold">
+                                          <p:stCondLst>
+                                            <p:cond delay="0"/>
+                                          </p:stCondLst>
+                                        </p:cTn>
+                                        <p:tgtEl>
+                                          <p:spTgt spid="22"/>
+                                        </p:tgtEl>
+                                        <p:attrNameLst>
+                                          <p:attrName>style.visibility</p:attrName>
+                                        </p:attrNameLst>
+                                      </p:cBhvr>
+                                      <p:to>
+                                        <p:strVal val="visible"/>
+                                      </p:to>
+                                    </p:set>
+                                    <p:anim calcmode="lin" valueType="num">
+                                      <p:cBhvr additive="base">
+                                        <p:cTn id="30" dur="500" fill="hold"/>
+                                        <p:tgtEl>
+                                          <p:spTgt spid="22"/>
+                                        </p:tgtEl>
+                                        <p:attrNameLst>
+                                          <p:attrName>ppt_x</p:attrName>
+                                        </p:attrNameLst>
+                                      </p:cBhvr>
+                                      <p:tavLst>
+                                        <p:tav tm="0">
+                                          <p:val>
+                                            <p:strVal val="#ppt_x"/>
+                                          </p:val>
+                                        </p:tav>
+                                        <p:tav tm="100000">
+                                          <p:val>
+                                            <p:strVal val="#ppt_x"/>
+                                          </p:val>
+                                        </p:tav>
+                                      </p:tavLst>
+                                    </p:anim>
+                                    <p:anim calcmode="lin" valueType="num">
+                                      <p:cBhvr additive="base">
+                                        <p:cTn id="31" dur="500" fill="hold"/>
+                                        <p:tgtEl>
+                                          <p:spTgt spid="22"/>
+                                        </p:tgtEl>
+                                        <p:attrNameLst>
+                                          <p:attrName>ppt_y</p:attrName>
+                                        </p:attrNameLst>
+                                      </p:cBhvr>
+                                      <p:tavLst>
+                                        <p:tav tm="0">
+                                          <p:val>
+                                            <p:strVal val="1+#ppt_h/2"/>
+                                          </p:val>
+                                        </p:tav>
+                                        <p:tav tm="100000">
+                                          <p:val>
+                                            <p:strVal val="#ppt_y"/>
+                                          </p:val>
+                                        </p:tav>
+                                      </p:tavLst>
+                                    </p:anim>
+                                  </p:childTnLst>
+                                </p:cTn>
+                              </p:par>
+                            </p:childTnLst>
+                          </p:cTn>
+                        </p:par>
+                      </p:childTnLst>
+                    </p:cTn>
+                  </p:par>
+                </p:childTnLst>
+              </p:cTn>
+              <p:prevCondLst>
+                <p:cond evt="onPrev" delay="0">
+                  <p:tgtEl>
+                    <p:sldTgt/>
+                  </p:tgtEl>
+                </p:cond>
+              </p:prevCondLst>
+              <p:nextCondLst>
+                <p:cond evt="onNext" delay="0">
+                  <p:tgtEl>
+                    <p:sldTgt/>
+                  </p:tgtEl>
+                </p:cond>
+              </p:nextCondLst>
+            </p:seq>
+          </p:childTnLst>
+        </p:cTn>
+      </p:par>
+    </p:tnLst>
+    <p:bldLst>
+      <p:bldP spid="23" grpId="0"/>
+      <p:bldP spid="24" grpId="0"/>
+    </p:bldLst>
+  </p:timing>
 </p:sld>
 </file>
 
@@ -12143,13 +12948,13 @@
   <p:clrMapOvr>
     <a:masterClrMapping/>
   </p:clrMapOvr>
-  <mc:AlternateContent xmlns:mc="http://schemas.openxmlformats.org/markup-compatibility/2006">
-    <mc:Choice xmlns:p159="http://schemas.microsoft.com/office/powerpoint/2015/09/main" Requires="p159">
+  <mc:AlternateContent xmlns:mc="http://schemas.openxmlformats.org/markup-compatibility/2006" xmlns:p159="http://schemas.microsoft.com/office/powerpoint/2015/09/main">
+    <mc:Choice Requires="p159">
       <p:transition xmlns:p14="http://schemas.microsoft.com/office/powerpoint/2010/main" spd="slow" p14:dur="3000">
         <p159:morph option="byObject"/>
       </p:transition>
     </mc:Choice>
-    <mc:Fallback>
+    <mc:Fallback xmlns="">
       <p:transition spd="slow">
         <p:fade/>
       </p:transition>
@@ -12727,13 +13532,13 @@
   <p:clrMapOvr>
     <a:masterClrMapping/>
   </p:clrMapOvr>
-  <mc:AlternateContent xmlns:mc="http://schemas.openxmlformats.org/markup-compatibility/2006">
-    <mc:Choice xmlns:p159="http://schemas.microsoft.com/office/powerpoint/2015/09/main" Requires="p159">
+  <mc:AlternateContent xmlns:mc="http://schemas.openxmlformats.org/markup-compatibility/2006" xmlns:p159="http://schemas.microsoft.com/office/powerpoint/2015/09/main">
+    <mc:Choice Requires="p159">
       <p:transition xmlns:p14="http://schemas.microsoft.com/office/powerpoint/2010/main" spd="slow" p14:dur="3000">
         <p159:morph option="byObject"/>
       </p:transition>
     </mc:Choice>
-    <mc:Fallback>
+    <mc:Fallback xmlns="">
       <p:transition spd="slow">
         <p:fade/>
       </p:transition>

</xml_diff>